<commit_message>
More work o Depletion
</commit_message>
<xml_diff>
--- a/modules/PPT/Depletion.pptx
+++ b/modules/PPT/Depletion.pptx
@@ -5,7 +5,7 @@
     <p:sldMasterId id="2147483648" r:id="rId1"/>
   </p:sldMasterIdLst>
   <p:notesMasterIdLst>
-    <p:notesMasterId r:id="rId10"/>
+    <p:notesMasterId r:id="rId12"/>
   </p:notesMasterIdLst>
   <p:sldIdLst>
     <p:sldId id="323" r:id="rId2"/>
@@ -14,8 +14,10 @@
     <p:sldId id="326" r:id="rId5"/>
     <p:sldId id="330" r:id="rId6"/>
     <p:sldId id="334" r:id="rId7"/>
-    <p:sldId id="332" r:id="rId8"/>
-    <p:sldId id="333" r:id="rId9"/>
+    <p:sldId id="335" r:id="rId8"/>
+    <p:sldId id="332" r:id="rId9"/>
+    <p:sldId id="333" r:id="rId10"/>
+    <p:sldId id="336" r:id="rId11"/>
   </p:sldIdLst>
   <p:sldSz cx="9144000" cy="6858000" type="screen4x3"/>
   <p:notesSz cx="6858000" cy="9144000"/>
@@ -3772,6 +3774,136 @@
     <p:extLst>
       <p:ext uri="{BB962C8B-B14F-4D97-AF65-F5344CB8AC3E}">
         <p14:creationId xmlns:p14="http://schemas.microsoft.com/office/powerpoint/2010/main" val="1173386501"/>
+      </p:ext>
+    </p:extLst>
+  </p:cSld>
+  <p:clrMapOvr>
+    <a:masterClrMapping/>
+  </p:clrMapOvr>
+  <p:timing>
+    <p:tnLst>
+      <p:par>
+        <p:cTn id="1" dur="indefinite" restart="never" nodeType="tmRoot"/>
+      </p:par>
+    </p:tnLst>
+  </p:timing>
+</p:sld>
+</file>
+
+<file path=ppt/slides/slide10.xml><?xml version="1.0" encoding="utf-8"?>
+<p:sld xmlns:a="http://schemas.openxmlformats.org/drawingml/2006/main" xmlns:r="http://schemas.openxmlformats.org/officeDocument/2006/relationships" xmlns:p="http://schemas.openxmlformats.org/presentationml/2006/main">
+  <p:cSld>
+    <p:spTree>
+      <p:nvGrpSpPr>
+        <p:cNvPr id="1" name=""/>
+        <p:cNvGrpSpPr/>
+        <p:nvPr/>
+      </p:nvGrpSpPr>
+      <p:grpSpPr>
+        <a:xfrm>
+          <a:off x="0" y="0"/>
+          <a:ext cx="0" cy="0"/>
+          <a:chOff x="0" y="0"/>
+          <a:chExt cx="0" cy="0"/>
+        </a:xfrm>
+      </p:grpSpPr>
+      <p:sp>
+        <p:nvSpPr>
+          <p:cNvPr id="2" name="Title 1"/>
+          <p:cNvSpPr>
+            <a:spLocks noGrp="1"/>
+          </p:cNvSpPr>
+          <p:nvPr>
+            <p:ph type="title"/>
+          </p:nvPr>
+        </p:nvSpPr>
+        <p:spPr/>
+        <p:txBody>
+          <a:bodyPr/>
+          <a:lstStyle/>
+          <a:p>
+            <a:r>
+              <a:rPr lang="en-US" dirty="0" smtClean="0"/>
+              <a:t>Class Exercise</a:t>
+            </a:r>
+            <a:endParaRPr lang="en-US" dirty="0"/>
+          </a:p>
+        </p:txBody>
+      </p:sp>
+      <p:sp>
+        <p:nvSpPr>
+          <p:cNvPr id="3" name="Content Placeholder 2"/>
+          <p:cNvSpPr>
+            <a:spLocks noGrp="1"/>
+          </p:cNvSpPr>
+          <p:nvPr>
+            <p:ph idx="1"/>
+          </p:nvPr>
+        </p:nvSpPr>
+        <p:spPr/>
+        <p:txBody>
+          <a:bodyPr/>
+          <a:lstStyle/>
+          <a:p>
+            <a:r>
+              <a:rPr lang="en-US" dirty="0" smtClean="0"/>
+              <a:t>Do Second Question</a:t>
+            </a:r>
+            <a:endParaRPr lang="en-US" dirty="0"/>
+          </a:p>
+        </p:txBody>
+      </p:sp>
+      <p:sp>
+        <p:nvSpPr>
+          <p:cNvPr id="4" name="Footer Placeholder 3"/>
+          <p:cNvSpPr>
+            <a:spLocks noGrp="1"/>
+          </p:cNvSpPr>
+          <p:nvPr>
+            <p:ph type="ftr" sz="quarter" idx="10"/>
+          </p:nvPr>
+        </p:nvSpPr>
+        <p:spPr/>
+        <p:txBody>
+          <a:bodyPr/>
+          <a:lstStyle/>
+          <a:p>
+            <a:r>
+              <a:rPr lang="en-US" smtClean="0"/>
+              <a:t>Abundance</a:t>
+            </a:r>
+            <a:endParaRPr lang="en-US"/>
+          </a:p>
+        </p:txBody>
+      </p:sp>
+      <p:sp>
+        <p:nvSpPr>
+          <p:cNvPr id="5" name="Slide Number Placeholder 4"/>
+          <p:cNvSpPr>
+            <a:spLocks noGrp="1"/>
+          </p:cNvSpPr>
+          <p:nvPr>
+            <p:ph type="sldNum" sz="quarter" idx="11"/>
+          </p:nvPr>
+        </p:nvSpPr>
+        <p:spPr/>
+        <p:txBody>
+          <a:bodyPr/>
+          <a:lstStyle/>
+          <a:p>
+            <a:fld id="{8B8D0034-34A8-4F4F-AD0F-588093AE7929}" type="slidenum">
+              <a:rPr lang="en-US" smtClean="0"/>
+              <a:pPr/>
+              <a:t>10</a:t>
+            </a:fld>
+            <a:endParaRPr lang="en-US"/>
+          </a:p>
+        </p:txBody>
+      </p:sp>
+    </p:spTree>
+    <p:extLst>
+      <p:ext uri="{BB962C8B-B14F-4D97-AF65-F5344CB8AC3E}">
+        <p14:creationId xmlns:p14="http://schemas.microsoft.com/office/powerpoint/2010/main" val="1402670358"/>
       </p:ext>
     </p:extLst>
   </p:cSld>
@@ -5655,7 +5787,7 @@
           <a:p>
             <a:r>
               <a:rPr lang="en-US" dirty="0" smtClean="0"/>
-              <a:t>Leslie Model Assumptions</a:t>
+              <a:t>Class Exercise</a:t>
             </a:r>
             <a:endParaRPr lang="en-US" dirty="0"/>
           </a:p>
@@ -5663,12 +5795,12 @@
       </p:sp>
       <p:sp>
         <p:nvSpPr>
-          <p:cNvPr id="4" name="Footer Placeholder 3"/>
-          <p:cNvSpPr>
-            <a:spLocks noGrp="1"/>
-          </p:cNvSpPr>
-          <p:nvPr>
-            <p:ph type="ftr" sz="quarter" idx="10"/>
+          <p:cNvPr id="3" name="Content Placeholder 2"/>
+          <p:cNvSpPr>
+            <a:spLocks noGrp="1"/>
+          </p:cNvSpPr>
+          <p:nvPr>
+            <p:ph idx="1"/>
           </p:nvPr>
         </p:nvSpPr>
         <p:spPr/>
@@ -5677,21 +5809,21 @@
           <a:lstStyle/>
           <a:p>
             <a:r>
-              <a:rPr lang="en-US" smtClean="0"/>
-              <a:t>Abundance</a:t>
-            </a:r>
-            <a:endParaRPr lang="en-US"/>
-          </a:p>
-        </p:txBody>
-      </p:sp>
-      <p:sp>
-        <p:nvSpPr>
-          <p:cNvPr id="5" name="Slide Number Placeholder 4"/>
-          <p:cNvSpPr>
-            <a:spLocks noGrp="1"/>
-          </p:cNvSpPr>
-          <p:nvPr>
-            <p:ph type="sldNum" sz="quarter" idx="11"/>
+              <a:rPr lang="en-US" dirty="0" smtClean="0"/>
+              <a:t>Do First Question</a:t>
+            </a:r>
+            <a:endParaRPr lang="en-US" dirty="0"/>
+          </a:p>
+        </p:txBody>
+      </p:sp>
+      <p:sp>
+        <p:nvSpPr>
+          <p:cNvPr id="4" name="Footer Placeholder 3"/>
+          <p:cNvSpPr>
+            <a:spLocks noGrp="1"/>
+          </p:cNvSpPr>
+          <p:nvPr>
+            <p:ph type="ftr" sz="quarter" idx="10"/>
           </p:nvPr>
         </p:nvSpPr>
         <p:spPr/>
@@ -5699,10 +5831,140 @@
           <a:bodyPr/>
           <a:lstStyle/>
           <a:p>
-            <a:fld id="{1885BB51-0796-4632-BDB9-6CE403630838}" type="slidenum">
+            <a:r>
+              <a:rPr lang="en-US" smtClean="0"/>
+              <a:t>Abundance</a:t>
+            </a:r>
+            <a:endParaRPr lang="en-US"/>
+          </a:p>
+        </p:txBody>
+      </p:sp>
+      <p:sp>
+        <p:nvSpPr>
+          <p:cNvPr id="5" name="Slide Number Placeholder 4"/>
+          <p:cNvSpPr>
+            <a:spLocks noGrp="1"/>
+          </p:cNvSpPr>
+          <p:nvPr>
+            <p:ph type="sldNum" sz="quarter" idx="11"/>
+          </p:nvPr>
+        </p:nvSpPr>
+        <p:spPr/>
+        <p:txBody>
+          <a:bodyPr/>
+          <a:lstStyle/>
+          <a:p>
+            <a:fld id="{8B8D0034-34A8-4F4F-AD0F-588093AE7929}" type="slidenum">
               <a:rPr lang="en-US" smtClean="0"/>
               <a:pPr/>
               <a:t>7</a:t>
+            </a:fld>
+            <a:endParaRPr lang="en-US"/>
+          </a:p>
+        </p:txBody>
+      </p:sp>
+    </p:spTree>
+    <p:extLst>
+      <p:ext uri="{BB962C8B-B14F-4D97-AF65-F5344CB8AC3E}">
+        <p14:creationId xmlns:p14="http://schemas.microsoft.com/office/powerpoint/2010/main" val="1135905031"/>
+      </p:ext>
+    </p:extLst>
+  </p:cSld>
+  <p:clrMapOvr>
+    <a:masterClrMapping/>
+  </p:clrMapOvr>
+  <p:timing>
+    <p:tnLst>
+      <p:par>
+        <p:cTn id="1" dur="indefinite" restart="never" nodeType="tmRoot"/>
+      </p:par>
+    </p:tnLst>
+  </p:timing>
+</p:sld>
+</file>
+
+<file path=ppt/slides/slide8.xml><?xml version="1.0" encoding="utf-8"?>
+<p:sld xmlns:a="http://schemas.openxmlformats.org/drawingml/2006/main" xmlns:r="http://schemas.openxmlformats.org/officeDocument/2006/relationships" xmlns:p="http://schemas.openxmlformats.org/presentationml/2006/main">
+  <p:cSld>
+    <p:spTree>
+      <p:nvGrpSpPr>
+        <p:cNvPr id="1" name=""/>
+        <p:cNvGrpSpPr/>
+        <p:nvPr/>
+      </p:nvGrpSpPr>
+      <p:grpSpPr>
+        <a:xfrm>
+          <a:off x="0" y="0"/>
+          <a:ext cx="0" cy="0"/>
+          <a:chOff x="0" y="0"/>
+          <a:chExt cx="0" cy="0"/>
+        </a:xfrm>
+      </p:grpSpPr>
+      <p:sp>
+        <p:nvSpPr>
+          <p:cNvPr id="2" name="Title 1"/>
+          <p:cNvSpPr>
+            <a:spLocks noGrp="1"/>
+          </p:cNvSpPr>
+          <p:nvPr>
+            <p:ph type="title"/>
+          </p:nvPr>
+        </p:nvSpPr>
+        <p:spPr/>
+        <p:txBody>
+          <a:bodyPr/>
+          <a:lstStyle/>
+          <a:p>
+            <a:r>
+              <a:rPr lang="en-US" dirty="0" smtClean="0"/>
+              <a:t>Leslie Model Assumptions</a:t>
+            </a:r>
+            <a:endParaRPr lang="en-US" dirty="0"/>
+          </a:p>
+        </p:txBody>
+      </p:sp>
+      <p:sp>
+        <p:nvSpPr>
+          <p:cNvPr id="4" name="Footer Placeholder 3"/>
+          <p:cNvSpPr>
+            <a:spLocks noGrp="1"/>
+          </p:cNvSpPr>
+          <p:nvPr>
+            <p:ph type="ftr" sz="quarter" idx="10"/>
+          </p:nvPr>
+        </p:nvSpPr>
+        <p:spPr/>
+        <p:txBody>
+          <a:bodyPr/>
+          <a:lstStyle/>
+          <a:p>
+            <a:r>
+              <a:rPr lang="en-US" smtClean="0"/>
+              <a:t>Abundance</a:t>
+            </a:r>
+            <a:endParaRPr lang="en-US"/>
+          </a:p>
+        </p:txBody>
+      </p:sp>
+      <p:sp>
+        <p:nvSpPr>
+          <p:cNvPr id="5" name="Slide Number Placeholder 4"/>
+          <p:cNvSpPr>
+            <a:spLocks noGrp="1"/>
+          </p:cNvSpPr>
+          <p:nvPr>
+            <p:ph type="sldNum" sz="quarter" idx="11"/>
+          </p:nvPr>
+        </p:nvSpPr>
+        <p:spPr/>
+        <p:txBody>
+          <a:bodyPr/>
+          <a:lstStyle/>
+          <a:p>
+            <a:fld id="{1885BB51-0796-4632-BDB9-6CE403630838}" type="slidenum">
+              <a:rPr lang="en-US" smtClean="0"/>
+              <a:pPr/>
+              <a:t>8</a:t>
             </a:fld>
             <a:endParaRPr lang="en-US"/>
           </a:p>
@@ -6067,7 +6329,7 @@
 </p:sld>
 </file>
 
-<file path=ppt/slides/slide8.xml><?xml version="1.0" encoding="utf-8"?>
+<file path=ppt/slides/slide9.xml><?xml version="1.0" encoding="utf-8"?>
 <p:sld xmlns:a="http://schemas.openxmlformats.org/drawingml/2006/main" xmlns:r="http://schemas.openxmlformats.org/officeDocument/2006/relationships" xmlns:p="http://schemas.openxmlformats.org/presentationml/2006/main">
   <p:cSld>
     <p:spTree>
@@ -6240,7 +6502,7 @@
             <a:fld id="{1885BB51-0796-4632-BDB9-6CE403630838}" type="slidenum">
               <a:rPr lang="en-US" smtClean="0"/>
               <a:pPr/>
-              <a:t>8</a:t>
+              <a:t>9</a:t>
             </a:fld>
             <a:endParaRPr lang="en-US"/>
           </a:p>

</xml_diff>